<commit_message>
Fix data tab: add charts and Plotly resize handler
- Add chart images (wordcloud, importance_timeline, category_radar, company_bar)
- Add JavaScript to resize Plotly charts when switching to hidden tabs
</commit_message>
<xml_diff>
--- a/2026-02-10/report.pptx
+++ b/2026-02-10/report.pptx
@@ -4863,7 +4863,7 @@
               </a:defRPr>
             </a:pPr>
             <a:r>
-              <a:t>TechCrunch: https://techcrunch.com/2026/02/05/openai-launches-new-agentic-coding-model-only-minutes-after-anthropic-drops-its-own/</a:t>
+              <a:t>IBM: https://www.ibm.com/think/news/ai-tech-trends-predictions-2026</a:t>
             </a:r>
           </a:p>
           <a:p>
@@ -4911,7 +4911,7 @@
               </a:defRPr>
             </a:pPr>
             <a:r>
-              <a:t>MIT Sloan Management Review: https://sloanreview.mit.edu/article/five-trends-in-ai-and-data-science-for-2026/</a:t>
+              <a:t>MIT Technology Review: https://www.technologyreview.com/2026/01/12/1130027/generative-coding-ai-software-2026-breakthrough-technology</a:t>
             </a:r>
           </a:p>
           <a:p>
@@ -4943,7 +4943,7 @@
               </a:defRPr>
             </a:pPr>
             <a:r>
-              <a:t>LLM Stats: https://llm-stats.com/llm-updates</a:t>
+              <a:t>TechCrunch: https://techcrunch.com/2026/02/05/openai-launches-new-agentic-coding-model-only-minutes-after-anthropic-drops-its-own/</a:t>
             </a:r>
           </a:p>
           <a:p>
@@ -4959,7 +4959,7 @@
               </a:defRPr>
             </a:pPr>
             <a:r>
-              <a:t>IBM: https://www.ibm.com/think/news/ai-tech-trends-predictions-2026</a:t>
+              <a:t>MIT Technology Review: https://www.technologyreview.com/2026/01/05/1130662/whats-next-for-ai-in-2026/</a:t>
             </a:r>
           </a:p>
           <a:p>
@@ -4975,7 +4975,7 @@
               </a:defRPr>
             </a:pPr>
             <a:r>
-              <a:t>Tech Startups: https://techstartups.com/2026/02/05/top-startup-and-tech-funding-news-february-5-2025/</a:t>
+              <a:t>LLM Stats: https://llm-stats.com/llm-updates</a:t>
             </a:r>
           </a:p>
           <a:p>
@@ -4991,7 +4991,7 @@
               </a:defRPr>
             </a:pPr>
             <a:r>
-              <a:t>MIT Technology Review: https://www.technologyreview.com/2026/01/12/1130027/generative-coding-ai-software-2026-breakthrough-technology</a:t>
+              <a:t>MIT Sloan Management Review: https://sloanreview.mit.edu/article/five-trends-in-ai-and-data-science-for-2026/</a:t>
             </a:r>
           </a:p>
           <a:p>
@@ -5007,7 +5007,7 @@
               </a:defRPr>
             </a:pPr>
             <a:r>
-              <a:t>MIT Technology Review: https://www.technologyreview.com/2026/01/05/1130662/whats-next-for-ai-in-2026/</a:t>
+              <a:t>Tech Startups: https://techstartups.com/2026/02/05/top-startup-and-tech-funding-news-february-5-2025/</a:t>
             </a:r>
           </a:p>
         </p:txBody>

</xml_diff>

<commit_message>
Fix truncated text in 2026-02-10 detailed analysis
Co-Authored-By: Claude Opus 4.6 <noreply@anthropic.com>
</commit_message>
<xml_diff>
--- a/2026-02-10/report.pptx
+++ b/2026-02-10/report.pptx
@@ -4863,7 +4863,7 @@
               </a:defRPr>
             </a:pPr>
             <a:r>
-              <a:t>IBM: https://www.ibm.com/think/news/ai-tech-trends-predictions-2026</a:t>
+              <a:t>MIT Technology Review: https://www.technologyreview.com/2026/01/12/1130027/generative-coding-ai-software-2026-breakthrough-technology</a:t>
             </a:r>
           </a:p>
           <a:p>
@@ -4879,7 +4879,7 @@
               </a:defRPr>
             </a:pPr>
             <a:r>
-              <a:t>Axios: https://www.axios.com/2026/02/06/amazon-microsoft-meta-ai-investment</a:t>
+              <a:t>LLM Stats: https://llm-stats.com/llm-updates</a:t>
             </a:r>
           </a:p>
           <a:p>
@@ -4895,7 +4895,7 @@
               </a:defRPr>
             </a:pPr>
             <a:r>
-              <a:t>CNN Business: https://www.cnn.com/2026/02/05/tech/anthropic-opus-update-software-stocks</a:t>
+              <a:t>Axios: https://www.axios.com/2026/02/06/amazon-microsoft-meta-ai-investment</a:t>
             </a:r>
           </a:p>
           <a:p>
@@ -4911,7 +4911,7 @@
               </a:defRPr>
             </a:pPr>
             <a:r>
-              <a:t>MIT Technology Review: https://www.technologyreview.com/2026/01/12/1130027/generative-coding-ai-software-2026-breakthrough-technology</a:t>
+              <a:t>National Law Review: https://natlawreview.com/article/2026-outlook-artificial-intelligence</a:t>
             </a:r>
           </a:p>
           <a:p>
@@ -4927,7 +4927,7 @@
               </a:defRPr>
             </a:pPr>
             <a:r>
-              <a:t>National Law Review: https://natlawreview.com/article/2026-outlook-artificial-intelligence</a:t>
+              <a:t>Tech Startups: https://techstartups.com/2026/02/05/top-startup-and-tech-funding-news-february-5-2025/</a:t>
             </a:r>
           </a:p>
           <a:p>
@@ -4943,7 +4943,7 @@
               </a:defRPr>
             </a:pPr>
             <a:r>
-              <a:t>TechCrunch: https://techcrunch.com/2026/02/05/openai-launches-new-agentic-coding-model-only-minutes-after-anthropic-drops-its-own/</a:t>
+              <a:t>MIT Sloan Management Review: https://sloanreview.mit.edu/article/five-trends-in-ai-and-data-science-for-2026/</a:t>
             </a:r>
           </a:p>
           <a:p>
@@ -4959,7 +4959,7 @@
               </a:defRPr>
             </a:pPr>
             <a:r>
-              <a:t>MIT Technology Review: https://www.technologyreview.com/2026/01/05/1130662/whats-next-for-ai-in-2026/</a:t>
+              <a:t>TechCrunch: https://techcrunch.com/2026/02/05/openai-launches-new-agentic-coding-model-only-minutes-after-anthropic-drops-its-own/</a:t>
             </a:r>
           </a:p>
           <a:p>
@@ -4975,7 +4975,7 @@
               </a:defRPr>
             </a:pPr>
             <a:r>
-              <a:t>LLM Stats: https://llm-stats.com/llm-updates</a:t>
+              <a:t>MIT Technology Review: https://www.technologyreview.com/2026/01/05/1130662/whats-next-for-ai-in-2026/</a:t>
             </a:r>
           </a:p>
           <a:p>
@@ -4991,7 +4991,7 @@
               </a:defRPr>
             </a:pPr>
             <a:r>
-              <a:t>MIT Sloan Management Review: https://sloanreview.mit.edu/article/five-trends-in-ai-and-data-science-for-2026/</a:t>
+              <a:t>CNN Business: https://www.cnn.com/2026/02/05/tech/anthropic-opus-update-software-stocks</a:t>
             </a:r>
           </a:p>
           <a:p>
@@ -5007,7 +5007,7 @@
               </a:defRPr>
             </a:pPr>
             <a:r>
-              <a:t>Tech Startups: https://techstartups.com/2026/02/05/top-startup-and-tech-funding-news-february-5-2025/</a:t>
+              <a:t>IBM: https://www.ibm.com/think/news/ai-tech-trends-predictions-2026</a:t>
             </a:r>
           </a:p>
         </p:txBody>

</xml_diff>

<commit_message>
Quality improvements: comparison date, chart fallback, prompt v2
- Show comparison data update date (weekly auto-update) instead of report date
- Add chart fallback: copy previous day's charts when generation fails
- Improve news collection prompt: Japanese sources, longer analysis fields,
  explicit anti-truncation rules, structured output schema expansion

Co-Authored-By: Claude Opus 4.6 <noreply@anthropic.com>
</commit_message>
<xml_diff>
--- a/2026-02-10/report.pptx
+++ b/2026-02-10/report.pptx
@@ -4270,7 +4270,7 @@
               </a:defRPr>
             </a:pPr>
             <a:r>
-              <a:t>Tech Startups: https://techstartups.com/2026/02/05/top-startup-and-tech-funding-news-february-5-2025/</a:t>
+              <a:t>CNN Business: https://www.cnn.com/2026/02/05/tech/anthropic-opus-update-software-stocks</a:t>
             </a:r>
           </a:p>
           <a:p>
@@ -4318,7 +4318,7 @@
               </a:defRPr>
             </a:pPr>
             <a:r>
-              <a:t>TechCrunch: https://techcrunch.com/2026/02/05/openai-launches-new-agentic-coding-model-only-minutes-after-anthropic-drops-its-own/</a:t>
+              <a:t>MIT Sloan Management Review: https://sloanreview.mit.edu/article/five-trends-in-ai-and-data-science-for-2026/</a:t>
             </a:r>
           </a:p>
           <a:p>
@@ -4334,7 +4334,7 @@
               </a:defRPr>
             </a:pPr>
             <a:r>
-              <a:t>LLM Stats: https://llm-stats.com/llm-updates</a:t>
+              <a:t>Tech Startups: https://techstartups.com/2026/02/05/top-startup-and-tech-funding-news-february-5-2025/</a:t>
             </a:r>
           </a:p>
           <a:p>
@@ -4350,7 +4350,7 @@
               </a:defRPr>
             </a:pPr>
             <a:r>
-              <a:t>National Law Review: https://natlawreview.com/article/2026-outlook-artificial-intelligence</a:t>
+              <a:t>LLM Stats: https://llm-stats.com/llm-updates</a:t>
             </a:r>
           </a:p>
           <a:p>
@@ -4366,7 +4366,7 @@
               </a:defRPr>
             </a:pPr>
             <a:r>
-              <a:t>Axios: https://www.axios.com/2026/02/06/amazon-microsoft-meta-ai-investment</a:t>
+              <a:t>National Law Review: https://natlawreview.com/article/2026-outlook-artificial-intelligence</a:t>
             </a:r>
           </a:p>
           <a:p>
@@ -4382,7 +4382,7 @@
               </a:defRPr>
             </a:pPr>
             <a:r>
-              <a:t>MIT Sloan Management Review: https://sloanreview.mit.edu/article/five-trends-in-ai-and-data-science-for-2026/</a:t>
+              <a:t>MIT Technology Review: https://www.technologyreview.com/2026/01/05/1130662/whats-next-for-ai-in-2026/</a:t>
             </a:r>
           </a:p>
           <a:p>
@@ -4398,7 +4398,7 @@
               </a:defRPr>
             </a:pPr>
             <a:r>
-              <a:t>CNN Business: https://www.cnn.com/2026/02/05/tech/anthropic-opus-update-software-stocks</a:t>
+              <a:t>TechCrunch: https://techcrunch.com/2026/02/05/openai-launches-new-agentic-coding-model-only-minutes-after-anthropic-drops-its-own/</a:t>
             </a:r>
           </a:p>
           <a:p>
@@ -4414,7 +4414,7 @@
               </a:defRPr>
             </a:pPr>
             <a:r>
-              <a:t>MIT Technology Review: https://www.technologyreview.com/2026/01/05/1130662/whats-next-for-ai-in-2026/</a:t>
+              <a:t>Axios: https://www.axios.com/2026/02/06/amazon-microsoft-meta-ai-investment</a:t>
             </a:r>
           </a:p>
         </p:txBody>

</xml_diff>